<commit_message>
first setup contract tool
</commit_message>
<xml_diff>
--- a/documentation/Mockup Contract tool v1.pptx
+++ b/documentation/Mockup Contract tool v1.pptx
@@ -260,7 +260,7 @@
           <a:p>
             <a:fld id="{F4083CBC-DC86-406B-95F5-066DBE3CA700}" type="datetimeFigureOut">
               <a:rPr lang="nl-NL" smtClean="0"/>
-              <a:t>3-5-2022</a:t>
+              <a:t>13-5-2022</a:t>
             </a:fld>
             <a:endParaRPr lang="nl-NL"/>
           </a:p>
@@ -458,7 +458,7 @@
           <a:p>
             <a:fld id="{F4083CBC-DC86-406B-95F5-066DBE3CA700}" type="datetimeFigureOut">
               <a:rPr lang="nl-NL" smtClean="0"/>
-              <a:t>3-5-2022</a:t>
+              <a:t>13-5-2022</a:t>
             </a:fld>
             <a:endParaRPr lang="nl-NL"/>
           </a:p>
@@ -666,7 +666,7 @@
           <a:p>
             <a:fld id="{F4083CBC-DC86-406B-95F5-066DBE3CA700}" type="datetimeFigureOut">
               <a:rPr lang="nl-NL" smtClean="0"/>
-              <a:t>3-5-2022</a:t>
+              <a:t>13-5-2022</a:t>
             </a:fld>
             <a:endParaRPr lang="nl-NL"/>
           </a:p>
@@ -864,7 +864,7 @@
           <a:p>
             <a:fld id="{F4083CBC-DC86-406B-95F5-066DBE3CA700}" type="datetimeFigureOut">
               <a:rPr lang="nl-NL" smtClean="0"/>
-              <a:t>3-5-2022</a:t>
+              <a:t>13-5-2022</a:t>
             </a:fld>
             <a:endParaRPr lang="nl-NL"/>
           </a:p>
@@ -1139,7 +1139,7 @@
           <a:p>
             <a:fld id="{F4083CBC-DC86-406B-95F5-066DBE3CA700}" type="datetimeFigureOut">
               <a:rPr lang="nl-NL" smtClean="0"/>
-              <a:t>3-5-2022</a:t>
+              <a:t>13-5-2022</a:t>
             </a:fld>
             <a:endParaRPr lang="nl-NL"/>
           </a:p>
@@ -1404,7 +1404,7 @@
           <a:p>
             <a:fld id="{F4083CBC-DC86-406B-95F5-066DBE3CA700}" type="datetimeFigureOut">
               <a:rPr lang="nl-NL" smtClean="0"/>
-              <a:t>3-5-2022</a:t>
+              <a:t>13-5-2022</a:t>
             </a:fld>
             <a:endParaRPr lang="nl-NL"/>
           </a:p>
@@ -1816,7 +1816,7 @@
           <a:p>
             <a:fld id="{F4083CBC-DC86-406B-95F5-066DBE3CA700}" type="datetimeFigureOut">
               <a:rPr lang="nl-NL" smtClean="0"/>
-              <a:t>3-5-2022</a:t>
+              <a:t>13-5-2022</a:t>
             </a:fld>
             <a:endParaRPr lang="nl-NL"/>
           </a:p>
@@ -1957,7 +1957,7 @@
           <a:p>
             <a:fld id="{F4083CBC-DC86-406B-95F5-066DBE3CA700}" type="datetimeFigureOut">
               <a:rPr lang="nl-NL" smtClean="0"/>
-              <a:t>3-5-2022</a:t>
+              <a:t>13-5-2022</a:t>
             </a:fld>
             <a:endParaRPr lang="nl-NL"/>
           </a:p>
@@ -2070,7 +2070,7 @@
           <a:p>
             <a:fld id="{F4083CBC-DC86-406B-95F5-066DBE3CA700}" type="datetimeFigureOut">
               <a:rPr lang="nl-NL" smtClean="0"/>
-              <a:t>3-5-2022</a:t>
+              <a:t>13-5-2022</a:t>
             </a:fld>
             <a:endParaRPr lang="nl-NL"/>
           </a:p>
@@ -2381,7 +2381,7 @@
           <a:p>
             <a:fld id="{F4083CBC-DC86-406B-95F5-066DBE3CA700}" type="datetimeFigureOut">
               <a:rPr lang="nl-NL" smtClean="0"/>
-              <a:t>3-5-2022</a:t>
+              <a:t>13-5-2022</a:t>
             </a:fld>
             <a:endParaRPr lang="nl-NL"/>
           </a:p>
@@ -2669,7 +2669,7 @@
           <a:p>
             <a:fld id="{F4083CBC-DC86-406B-95F5-066DBE3CA700}" type="datetimeFigureOut">
               <a:rPr lang="nl-NL" smtClean="0"/>
-              <a:t>3-5-2022</a:t>
+              <a:t>13-5-2022</a:t>
             </a:fld>
             <a:endParaRPr lang="nl-NL"/>
           </a:p>
@@ -2910,7 +2910,7 @@
           <a:p>
             <a:fld id="{F4083CBC-DC86-406B-95F5-066DBE3CA700}" type="datetimeFigureOut">
               <a:rPr lang="nl-NL" smtClean="0"/>
-              <a:t>3-5-2022</a:t>
+              <a:t>13-5-2022</a:t>
             </a:fld>
             <a:endParaRPr lang="nl-NL"/>
           </a:p>
@@ -6001,18 +6001,18 @@
 </file>
 
 <file path=customXml/item1.xml><?xml version="1.0" encoding="utf-8"?>
+<p:properties xmlns:p="http://schemas.microsoft.com/office/2006/metadata/properties" xmlns:xsi="http://www.w3.org/2001/XMLSchema-instance" xmlns:pc="http://schemas.microsoft.com/office/infopath/2007/PartnerControls">
+  <documentManagement/>
+</p:properties>
+</file>
+
+<file path=customXml/item2.xml><?xml version="1.0" encoding="utf-8"?>
 <?mso-contentType ?>
 <FormTemplates xmlns="http://schemas.microsoft.com/sharepoint/v3/contenttype/forms">
   <Display>DocumentLibraryForm</Display>
   <Edit>DocumentLibraryForm</Edit>
   <New>DocumentLibraryForm</New>
 </FormTemplates>
-</file>
-
-<file path=customXml/item2.xml><?xml version="1.0" encoding="utf-8"?>
-<p:properties xmlns:p="http://schemas.microsoft.com/office/2006/metadata/properties" xmlns:xsi="http://www.w3.org/2001/XMLSchema-instance" xmlns:pc="http://schemas.microsoft.com/office/infopath/2007/PartnerControls">
-  <documentManagement/>
-</p:properties>
 </file>
 
 <file path=customXml/item3.xml><?xml version="1.0" encoding="utf-8"?>
@@ -6213,14 +6213,6 @@
 </file>
 
 <file path=customXml/itemProps1.xml><?xml version="1.0" encoding="utf-8"?>
-<ds:datastoreItem xmlns:ds="http://schemas.openxmlformats.org/officeDocument/2006/customXml" ds:itemID="{DBF8B3A0-04E2-4B46-B8E5-65C3E2AB5259}">
-  <ds:schemaRefs>
-    <ds:schemaRef ds:uri="http://schemas.microsoft.com/sharepoint/v3/contenttype/forms"/>
-  </ds:schemaRefs>
-</ds:datastoreItem>
-</file>
-
-<file path=customXml/itemProps2.xml><?xml version="1.0" encoding="utf-8"?>
 <ds:datastoreItem xmlns:ds="http://schemas.openxmlformats.org/officeDocument/2006/customXml" ds:itemID="{74B4B0B6-112C-4D56-BC61-958C9511EFEB}">
   <ds:schemaRefs>
     <ds:schemaRef ds:uri="http://schemas.microsoft.com/office/2006/metadata/properties"/>
@@ -6233,6 +6225,14 @@
     <ds:schemaRef ds:uri="238198d6-04d2-405f-8d1c-68b069c8778f"/>
     <ds:schemaRef ds:uri="http://www.w3.org/XML/1998/namespace"/>
     <ds:schemaRef ds:uri="http://purl.org/dc/dcmitype/"/>
+  </ds:schemaRefs>
+</ds:datastoreItem>
+</file>
+
+<file path=customXml/itemProps2.xml><?xml version="1.0" encoding="utf-8"?>
+<ds:datastoreItem xmlns:ds="http://schemas.openxmlformats.org/officeDocument/2006/customXml" ds:itemID="{DBF8B3A0-04E2-4B46-B8E5-65C3E2AB5259}">
+  <ds:schemaRefs>
+    <ds:schemaRef ds:uri="http://schemas.microsoft.com/sharepoint/v3/contenttype/forms"/>
   </ds:schemaRefs>
 </ds:datastoreItem>
 </file>

</xml_diff>